<commit_message>
655. Print Binary Tree
</commit_message>
<xml_diff>
--- a/other_github/（模板）LeetCode 第  题：“”题解配图.pptx
+++ b/other_github/（模板）LeetCode 第  题：“”题解配图.pptx
@@ -6,7 +6,6 @@
   </p:sldMasterIdLst>
   <p:sldIdLst>
     <p:sldId id="259" r:id="rId2"/>
-    <p:sldId id="260" r:id="rId3"/>
   </p:sldIdLst>
   <p:sldSz cx="12192000" cy="6858000"/>
   <p:notesSz cx="6858000" cy="9144000"/>
@@ -107,7 +106,7 @@
   </p:defaultTextStyle>
   <p:extLst>
     <p:ext uri="{EFAFB233-063F-42B5-8137-9DF3F51BA10A}">
-      <p15:sldGuideLst xmlns:p15="http://schemas.microsoft.com/office/powerpoint/2012/main"/>
+      <p15:sldGuideLst xmlns:p15="http://schemas.microsoft.com/office/powerpoint/2012/main" xmlns=""/>
     </p:ext>
   </p:extLst>
 </p:presentation>
@@ -135,7 +134,7 @@
           <p:cNvPr id="8" name="矩形 7">
             <a:extLst>
               <a:ext uri="{FF2B5EF4-FFF2-40B4-BE49-F238E27FC236}">
-                <a16:creationId xmlns:a16="http://schemas.microsoft.com/office/drawing/2014/main" id="{F399C0FD-7C40-0147-8ACB-4E13D9DFBB9C}"/>
+                <a16:creationId xmlns:a16="http://schemas.microsoft.com/office/drawing/2014/main" xmlns="" id="{F399C0FD-7C40-0147-8ACB-4E13D9DFBB9C}"/>
               </a:ext>
             </a:extLst>
           </p:cNvPr>
@@ -181,7 +180,7 @@
           <p:cNvPr id="7" name="图片 6">
             <a:extLst>
               <a:ext uri="{FF2B5EF4-FFF2-40B4-BE49-F238E27FC236}">
-                <a16:creationId xmlns:a16="http://schemas.microsoft.com/office/drawing/2014/main" id="{82370E24-12B4-C64E-A72C-43E85C52D83B}"/>
+                <a16:creationId xmlns:a16="http://schemas.microsoft.com/office/drawing/2014/main" xmlns="" id="{82370E24-12B4-C64E-A72C-43E85C52D83B}"/>
               </a:ext>
             </a:extLst>
           </p:cNvPr>
@@ -209,7 +208,7 @@
     </p:spTree>
     <p:extLst>
       <p:ext uri="{BB962C8B-B14F-4D97-AF65-F5344CB8AC3E}">
-        <p14:creationId xmlns:p14="http://schemas.microsoft.com/office/powerpoint/2010/main" val="1392055626"/>
+        <p14:creationId xmlns:p14="http://schemas.microsoft.com/office/powerpoint/2010/main" xmlns="" val="1392055626"/>
       </p:ext>
     </p:extLst>
   </p:cSld>
@@ -347,7 +346,8 @@
           <a:p>
             <a:fld id="{7C955CD6-C544-6447-88CB-A2D8D4C328B3}" type="datetimeFigureOut">
               <a:rPr kumimoji="1" lang="zh-CN" altLang="en-US" smtClean="0"/>
-              <a:t>2019/7/26</a:t>
+              <a:pPr/>
+              <a:t>2019/8/28</a:t>
             </a:fld>
             <a:endParaRPr kumimoji="1" lang="zh-CN" altLang="en-US"/>
           </a:p>
@@ -425,6 +425,7 @@
           <a:p>
             <a:fld id="{502A6B2C-FFFF-F842-A641-B920BDB4AC58}" type="slidenum">
               <a:rPr kumimoji="1" lang="zh-CN" altLang="en-US" smtClean="0"/>
+              <a:pPr/>
               <a:t>‹#›</a:t>
             </a:fld>
             <a:endParaRPr kumimoji="1" lang="zh-CN" altLang="en-US"/>
@@ -434,7 +435,7 @@
     </p:spTree>
     <p:extLst>
       <p:ext uri="{BB962C8B-B14F-4D97-AF65-F5344CB8AC3E}">
-        <p14:creationId xmlns:p14="http://schemas.microsoft.com/office/powerpoint/2010/main" val="1469646871"/>
+        <p14:creationId xmlns:p14="http://schemas.microsoft.com/office/powerpoint/2010/main" xmlns="" val="1469646871"/>
       </p:ext>
     </p:extLst>
   </p:cSld>
@@ -747,7 +748,7 @@
           <p:cNvPr id="5" name="矩形 4">
             <a:extLst>
               <a:ext uri="{FF2B5EF4-FFF2-40B4-BE49-F238E27FC236}">
-                <a16:creationId xmlns:a16="http://schemas.microsoft.com/office/drawing/2014/main" id="{C578AC20-C502-6149-932E-58F0DC329CC2}"/>
+                <a16:creationId xmlns:a16="http://schemas.microsoft.com/office/drawing/2014/main" xmlns="" id="{C578AC20-C502-6149-932E-58F0DC329CC2}"/>
               </a:ext>
             </a:extLst>
           </p:cNvPr>
@@ -864,7 +865,7 @@
           <p:cNvPr id="9" name="文本框 8">
             <a:extLst>
               <a:ext uri="{FF2B5EF4-FFF2-40B4-BE49-F238E27FC236}">
-                <a16:creationId xmlns:a16="http://schemas.microsoft.com/office/drawing/2014/main" id="{55DBF594-AA63-9A4C-A12C-DB0FB817550D}"/>
+                <a16:creationId xmlns:a16="http://schemas.microsoft.com/office/drawing/2014/main" xmlns="" id="{55DBF594-AA63-9A4C-A12C-DB0FB817550D}"/>
               </a:ext>
             </a:extLst>
           </p:cNvPr>
@@ -919,7 +920,7 @@
           <p:cNvPr id="10" name="文本框 9">
             <a:extLst>
               <a:ext uri="{FF2B5EF4-FFF2-40B4-BE49-F238E27FC236}">
-                <a16:creationId xmlns:a16="http://schemas.microsoft.com/office/drawing/2014/main" id="{372D66D5-2895-AA46-B422-C71300AA3F31}"/>
+                <a16:creationId xmlns:a16="http://schemas.microsoft.com/office/drawing/2014/main" xmlns="" id="{372D66D5-2895-AA46-B422-C71300AA3F31}"/>
               </a:ext>
             </a:extLst>
           </p:cNvPr>
@@ -977,7 +978,7 @@
           <p:cNvPr id="11" name="矩形 10">
             <a:extLst>
               <a:ext uri="{FF2B5EF4-FFF2-40B4-BE49-F238E27FC236}">
-                <a16:creationId xmlns:a16="http://schemas.microsoft.com/office/drawing/2014/main" id="{6BD68976-046E-3E40-BEC5-C5ADED73127E}"/>
+                <a16:creationId xmlns:a16="http://schemas.microsoft.com/office/drawing/2014/main" xmlns="" id="{6BD68976-046E-3E40-BEC5-C5ADED73127E}"/>
               </a:ext>
             </a:extLst>
           </p:cNvPr>
@@ -1133,7 +1134,7 @@
           <p:cNvPr id="12" name="直线箭头连接符 11">
             <a:extLst>
               <a:ext uri="{FF2B5EF4-FFF2-40B4-BE49-F238E27FC236}">
-                <a16:creationId xmlns:a16="http://schemas.microsoft.com/office/drawing/2014/main" id="{3DD8A902-459E-B144-8584-BFE0C4F0E05F}"/>
+                <a16:creationId xmlns:a16="http://schemas.microsoft.com/office/drawing/2014/main" xmlns="" id="{3DD8A902-459E-B144-8584-BFE0C4F0E05F}"/>
               </a:ext>
             </a:extLst>
           </p:cNvPr>
@@ -1177,7 +1178,7 @@
           <p:cNvPr id="13" name="直线箭头连接符 12">
             <a:extLst>
               <a:ext uri="{FF2B5EF4-FFF2-40B4-BE49-F238E27FC236}">
-                <a16:creationId xmlns:a16="http://schemas.microsoft.com/office/drawing/2014/main" id="{D721E4B3-AC1D-8F4B-A133-ED7C8DD5811B}"/>
+                <a16:creationId xmlns:a16="http://schemas.microsoft.com/office/drawing/2014/main" xmlns="" id="{D721E4B3-AC1D-8F4B-A133-ED7C8DD5811B}"/>
               </a:ext>
             </a:extLst>
           </p:cNvPr>
@@ -1221,7 +1222,7 @@
           <p:cNvPr id="14" name="矩形 13">
             <a:extLst>
               <a:ext uri="{FF2B5EF4-FFF2-40B4-BE49-F238E27FC236}">
-                <a16:creationId xmlns:a16="http://schemas.microsoft.com/office/drawing/2014/main" id="{6F68B0C5-6CC1-DD4E-ADDC-A27C7A1A214B}"/>
+                <a16:creationId xmlns:a16="http://schemas.microsoft.com/office/drawing/2014/main" xmlns="" id="{6F68B0C5-6CC1-DD4E-ADDC-A27C7A1A214B}"/>
               </a:ext>
             </a:extLst>
           </p:cNvPr>
@@ -1275,7 +1276,7 @@
           <p:cNvPr id="15" name="矩形 14">
             <a:extLst>
               <a:ext uri="{FF2B5EF4-FFF2-40B4-BE49-F238E27FC236}">
-                <a16:creationId xmlns:a16="http://schemas.microsoft.com/office/drawing/2014/main" id="{E1DC3C7E-E6D7-9A47-9142-9E8745301213}"/>
+                <a16:creationId xmlns:a16="http://schemas.microsoft.com/office/drawing/2014/main" xmlns="" id="{E1DC3C7E-E6D7-9A47-9142-9E8745301213}"/>
               </a:ext>
             </a:extLst>
           </p:cNvPr>
@@ -1329,7 +1330,7 @@
           <p:cNvPr id="16" name="下箭头 15">
             <a:extLst>
               <a:ext uri="{FF2B5EF4-FFF2-40B4-BE49-F238E27FC236}">
-                <a16:creationId xmlns:a16="http://schemas.microsoft.com/office/drawing/2014/main" id="{E30C792B-C65F-E84D-868F-65B65FD9AFB6}"/>
+                <a16:creationId xmlns:a16="http://schemas.microsoft.com/office/drawing/2014/main" xmlns="" id="{E30C792B-C65F-E84D-868F-65B65FD9AFB6}"/>
               </a:ext>
             </a:extLst>
           </p:cNvPr>
@@ -1390,7 +1391,7 @@
           <p:cNvPr id="17" name="左大括号 16">
             <a:extLst>
               <a:ext uri="{FF2B5EF4-FFF2-40B4-BE49-F238E27FC236}">
-                <a16:creationId xmlns:a16="http://schemas.microsoft.com/office/drawing/2014/main" id="{93285427-6338-B644-BFCC-FADA6E857965}"/>
+                <a16:creationId xmlns:a16="http://schemas.microsoft.com/office/drawing/2014/main" xmlns="" id="{93285427-6338-B644-BFCC-FADA6E857965}"/>
               </a:ext>
             </a:extLst>
           </p:cNvPr>
@@ -1442,7 +1443,7 @@
           <p:cNvPr id="18" name="矩形 17">
             <a:extLst>
               <a:ext uri="{FF2B5EF4-FFF2-40B4-BE49-F238E27FC236}">
-                <a16:creationId xmlns:a16="http://schemas.microsoft.com/office/drawing/2014/main" id="{42D33C7C-D1D3-A84B-B42A-812F7FBF5498}"/>
+                <a16:creationId xmlns:a16="http://schemas.microsoft.com/office/drawing/2014/main" xmlns="" id="{42D33C7C-D1D3-A84B-B42A-812F7FBF5498}"/>
               </a:ext>
             </a:extLst>
           </p:cNvPr>
@@ -1525,7 +1526,7 @@
           <p:cNvPr id="19" name="矩形 18">
             <a:extLst>
               <a:ext uri="{FF2B5EF4-FFF2-40B4-BE49-F238E27FC236}">
-                <a16:creationId xmlns:a16="http://schemas.microsoft.com/office/drawing/2014/main" id="{1ADEC195-B0DD-324C-9E37-3DD086759CC9}"/>
+                <a16:creationId xmlns:a16="http://schemas.microsoft.com/office/drawing/2014/main" xmlns="" id="{1ADEC195-B0DD-324C-9E37-3DD086759CC9}"/>
               </a:ext>
             </a:extLst>
           </p:cNvPr>
@@ -1595,7 +1596,7 @@
           <p:cNvPr id="20" name="左大括号 19">
             <a:extLst>
               <a:ext uri="{FF2B5EF4-FFF2-40B4-BE49-F238E27FC236}">
-                <a16:creationId xmlns:a16="http://schemas.microsoft.com/office/drawing/2014/main" id="{6895D63B-40C2-974F-AE64-BA4D4781C631}"/>
+                <a16:creationId xmlns:a16="http://schemas.microsoft.com/office/drawing/2014/main" xmlns="" id="{6895D63B-40C2-974F-AE64-BA4D4781C631}"/>
               </a:ext>
             </a:extLst>
           </p:cNvPr>
@@ -1631,60 +1632,6 @@
           </a:effectRef>
           <a:fontRef idx="minor">
             <a:schemeClr val="tx1"/>
-          </a:fontRef>
-        </p:style>
-        <p:txBody>
-          <a:bodyPr rtlCol="0" anchor="ctr"/>
-          <a:lstStyle/>
-          <a:p>
-            <a:pPr algn="ctr"/>
-            <a:endParaRPr kumimoji="1" lang="zh-CN" altLang="en-US"/>
-          </a:p>
-        </p:txBody>
-      </p:sp>
-      <p:sp>
-        <p:nvSpPr>
-          <p:cNvPr id="21" name="圆角矩形 20">
-            <a:extLst>
-              <a:ext uri="{FF2B5EF4-FFF2-40B4-BE49-F238E27FC236}">
-                <a16:creationId xmlns:a16="http://schemas.microsoft.com/office/drawing/2014/main" id="{E9694495-6765-3E47-A164-6A9D8BC641E3}"/>
-              </a:ext>
-            </a:extLst>
-          </p:cNvPr>
-          <p:cNvSpPr/>
-          <p:nvPr/>
-        </p:nvSpPr>
-        <p:spPr>
-          <a:xfrm>
-            <a:off x="433427" y="753820"/>
-            <a:ext cx="7517719" cy="463371"/>
-          </a:xfrm>
-          <a:prstGeom prst="roundRect">
-            <a:avLst/>
-          </a:prstGeom>
-          <a:solidFill>
-            <a:srgbClr val="FFFF00">
-              <a:alpha val="50000"/>
-            </a:srgbClr>
-          </a:solidFill>
-          <a:ln>
-            <a:noFill/>
-          </a:ln>
-        </p:spPr>
-        <p:style>
-          <a:lnRef idx="2">
-            <a:schemeClr val="accent1">
-              <a:shade val="50000"/>
-            </a:schemeClr>
-          </a:lnRef>
-          <a:fillRef idx="1">
-            <a:schemeClr val="accent1"/>
-          </a:fillRef>
-          <a:effectRef idx="0">
-            <a:schemeClr val="accent1"/>
-          </a:effectRef>
-          <a:fontRef idx="minor">
-            <a:schemeClr val="lt1"/>
           </a:fontRef>
         </p:style>
         <p:txBody>
@@ -1701,7 +1648,7 @@
           <p:cNvPr id="22" name="图形 21" descr="剪刀">
             <a:extLst>
               <a:ext uri="{FF2B5EF4-FFF2-40B4-BE49-F238E27FC236}">
-                <a16:creationId xmlns:a16="http://schemas.microsoft.com/office/drawing/2014/main" id="{1877E808-94C8-BC4F-B2F6-204E113C89CD}"/>
+                <a16:creationId xmlns:a16="http://schemas.microsoft.com/office/drawing/2014/main" xmlns="" id="{1877E808-94C8-BC4F-B2F6-204E113C89CD}"/>
               </a:ext>
             </a:extLst>
           </p:cNvPr>
@@ -1714,7 +1661,7 @@
           <a:blip r:embed="rId2">
             <a:extLst>
               <a:ext uri="{96DAC541-7B7A-43D3-8B79-37D633B846F1}">
-                <asvg:svgBlip xmlns:asvg="http://schemas.microsoft.com/office/drawing/2016/SVG/main" r:embed="rId3"/>
+                <asvg:svgBlip xmlns:asvg="http://schemas.microsoft.com/office/drawing/2016/SVG/main" xmlns="" r:embed="rId3"/>
               </a:ext>
             </a:extLst>
           </a:blip>
@@ -1737,7 +1684,7 @@
           <p:cNvPr id="23" name="图形 22" descr="剪刀">
             <a:extLst>
               <a:ext uri="{FF2B5EF4-FFF2-40B4-BE49-F238E27FC236}">
-                <a16:creationId xmlns:a16="http://schemas.microsoft.com/office/drawing/2014/main" id="{ABFBD405-C926-FB45-92D4-760652D16052}"/>
+                <a16:creationId xmlns:a16="http://schemas.microsoft.com/office/drawing/2014/main" xmlns="" id="{ABFBD405-C926-FB45-92D4-760652D16052}"/>
               </a:ext>
             </a:extLst>
           </p:cNvPr>
@@ -1750,7 +1697,7 @@
           <a:blip r:embed="rId4">
             <a:extLst>
               <a:ext uri="{96DAC541-7B7A-43D3-8B79-37D633B846F1}">
-                <asvg:svgBlip xmlns:asvg="http://schemas.microsoft.com/office/drawing/2016/SVG/main" r:embed="rId5"/>
+                <asvg:svgBlip xmlns:asvg="http://schemas.microsoft.com/office/drawing/2016/SVG/main" xmlns="" r:embed="rId5"/>
               </a:ext>
             </a:extLst>
           </a:blip>
@@ -1773,7 +1720,7 @@
           <p:cNvPr id="24" name="下箭头 23">
             <a:extLst>
               <a:ext uri="{FF2B5EF4-FFF2-40B4-BE49-F238E27FC236}">
-                <a16:creationId xmlns:a16="http://schemas.microsoft.com/office/drawing/2014/main" id="{E244C267-4466-4F4C-8A1C-EC2E9F40D8A5}"/>
+                <a16:creationId xmlns:a16="http://schemas.microsoft.com/office/drawing/2014/main" xmlns="" id="{E244C267-4466-4F4C-8A1C-EC2E9F40D8A5}"/>
               </a:ext>
             </a:extLst>
           </p:cNvPr>
@@ -1844,315 +1791,7 @@
     </p:spTree>
     <p:extLst>
       <p:ext uri="{BB962C8B-B14F-4D97-AF65-F5344CB8AC3E}">
-        <p14:creationId xmlns:p14="http://schemas.microsoft.com/office/powerpoint/2010/main" val="3320046645"/>
-      </p:ext>
-    </p:extLst>
-  </p:cSld>
-  <p:clrMapOvr>
-    <a:masterClrMapping/>
-  </p:clrMapOvr>
-</p:sld>
-</file>
-
-<file path=ppt/slides/slide2.xml><?xml version="1.0" encoding="utf-8"?>
-<p:sld xmlns:a="http://schemas.openxmlformats.org/drawingml/2006/main" xmlns:r="http://schemas.openxmlformats.org/officeDocument/2006/relationships" xmlns:p="http://schemas.openxmlformats.org/presentationml/2006/main">
-  <p:cSld>
-    <p:spTree>
-      <p:nvGrpSpPr>
-        <p:cNvPr id="1" name=""/>
-        <p:cNvGrpSpPr/>
-        <p:nvPr/>
-      </p:nvGrpSpPr>
-      <p:grpSpPr>
-        <a:xfrm>
-          <a:off x="0" y="0"/>
-          <a:ext cx="0" cy="0"/>
-          <a:chOff x="0" y="0"/>
-          <a:chExt cx="0" cy="0"/>
-        </a:xfrm>
-      </p:grpSpPr>
-      <p:grpSp>
-        <p:nvGrpSpPr>
-          <p:cNvPr id="2" name="组合 1">
-            <a:extLst>
-              <a:ext uri="{FF2B5EF4-FFF2-40B4-BE49-F238E27FC236}">
-                <a16:creationId xmlns:a16="http://schemas.microsoft.com/office/drawing/2014/main" id="{E17A1EF0-30D7-324A-A54E-FC81A8598299}"/>
-              </a:ext>
-            </a:extLst>
-          </p:cNvPr>
-          <p:cNvGrpSpPr/>
-          <p:nvPr/>
-        </p:nvGrpSpPr>
-        <p:grpSpPr>
-          <a:xfrm>
-            <a:off x="193709" y="2713873"/>
-            <a:ext cx="6119446" cy="1751207"/>
-            <a:chOff x="6224954" y="5013009"/>
-            <a:chExt cx="6119446" cy="1751207"/>
-          </a:xfrm>
-        </p:grpSpPr>
-        <p:sp>
-          <p:nvSpPr>
-            <p:cNvPr id="3" name="矩形 2">
-              <a:extLst>
-                <a:ext uri="{FF2B5EF4-FFF2-40B4-BE49-F238E27FC236}">
-                  <a16:creationId xmlns:a16="http://schemas.microsoft.com/office/drawing/2014/main" id="{DE3F44D5-8701-B34C-A174-A1CDCDD0D31D}"/>
-                </a:ext>
-              </a:extLst>
-            </p:cNvPr>
-            <p:cNvSpPr/>
-            <p:nvPr/>
-          </p:nvSpPr>
-          <p:spPr>
-            <a:xfrm>
-              <a:off x="6224954" y="5013010"/>
-              <a:ext cx="6119446" cy="1751206"/>
-            </a:xfrm>
-            <a:prstGeom prst="rect">
-              <a:avLst/>
-            </a:prstGeom>
-            <a:solidFill>
-              <a:srgbClr val="FFFF00">
-                <a:alpha val="20000"/>
-              </a:srgbClr>
-            </a:solidFill>
-            <a:ln>
-              <a:noFill/>
-            </a:ln>
-          </p:spPr>
-          <p:style>
-            <a:lnRef idx="2">
-              <a:schemeClr val="accent1">
-                <a:shade val="50000"/>
-              </a:schemeClr>
-            </a:lnRef>
-            <a:fillRef idx="1">
-              <a:schemeClr val="accent1"/>
-            </a:fillRef>
-            <a:effectRef idx="0">
-              <a:schemeClr val="accent1"/>
-            </a:effectRef>
-            <a:fontRef idx="minor">
-              <a:schemeClr val="lt1"/>
-            </a:fontRef>
-          </p:style>
-          <p:txBody>
-            <a:bodyPr rtlCol="0" anchor="ctr"/>
-            <a:lstStyle/>
-            <a:p>
-              <a:pPr algn="ctr"/>
-              <a:endParaRPr kumimoji="1" lang="zh-CN" altLang="en-US" dirty="0"/>
-            </a:p>
-          </p:txBody>
-        </p:sp>
-        <p:sp>
-          <p:nvSpPr>
-            <p:cNvPr id="4" name="矩形 3">
-              <a:extLst>
-                <a:ext uri="{FF2B5EF4-FFF2-40B4-BE49-F238E27FC236}">
-                  <a16:creationId xmlns:a16="http://schemas.microsoft.com/office/drawing/2014/main" id="{BB45B0CD-25A3-6748-AFAD-90BAC00EF296}"/>
-                </a:ext>
-              </a:extLst>
-            </p:cNvPr>
-            <p:cNvSpPr/>
-            <p:nvPr/>
-          </p:nvSpPr>
-          <p:spPr>
-            <a:xfrm>
-              <a:off x="6374709" y="5399974"/>
-              <a:ext cx="4281569" cy="369332"/>
-            </a:xfrm>
-            <a:prstGeom prst="rect">
-              <a:avLst/>
-            </a:prstGeom>
-            <a:solidFill>
-              <a:srgbClr val="0432FF"/>
-            </a:solidFill>
-            <a:effectLst>
-              <a:softEdge rad="31750"/>
-            </a:effectLst>
-          </p:spPr>
-          <p:txBody>
-            <a:bodyPr wrap="square">
-              <a:spAutoFit/>
-            </a:bodyPr>
-            <a:lstStyle/>
-            <a:p>
-              <a:r>
-                <a:rPr lang="zh-CN" altLang="en-US" dirty="0">
-                  <a:solidFill>
-                    <a:schemeClr val="bg1"/>
-                  </a:solidFill>
-                  <a:latin typeface="Times New Roman" panose="02020603050405020304" pitchFamily="18" charset="0"/>
-                  <a:ea typeface="KaiTi_GB2312" panose="02010609030101010101" pitchFamily="49" charset="-122"/>
-                  <a:cs typeface="Times New Roman" panose="02020603050405020304" pitchFamily="18" charset="0"/>
-                </a:rPr>
-                <a:t>蓝色结点为非叶子结点，表示递归求解。</a:t>
-              </a:r>
-              <a:endParaRPr lang="en-US" altLang="zh-CN" dirty="0">
-                <a:solidFill>
-                  <a:schemeClr val="bg1"/>
-                </a:solidFill>
-                <a:latin typeface="Times New Roman" panose="02020603050405020304" pitchFamily="18" charset="0"/>
-                <a:ea typeface="KaiTi_GB2312" panose="02010609030101010101" pitchFamily="49" charset="-122"/>
-                <a:cs typeface="Times New Roman" panose="02020603050405020304" pitchFamily="18" charset="0"/>
-              </a:endParaRPr>
-            </a:p>
-          </p:txBody>
-        </p:sp>
-        <p:sp>
-          <p:nvSpPr>
-            <p:cNvPr id="5" name="矩形 4">
-              <a:extLst>
-                <a:ext uri="{FF2B5EF4-FFF2-40B4-BE49-F238E27FC236}">
-                  <a16:creationId xmlns:a16="http://schemas.microsoft.com/office/drawing/2014/main" id="{F9EBBC4E-EEB5-1C4E-97CD-0D1B1E821AEC}"/>
-                </a:ext>
-              </a:extLst>
-            </p:cNvPr>
-            <p:cNvSpPr/>
-            <p:nvPr/>
-          </p:nvSpPr>
-          <p:spPr>
-            <a:xfrm>
-              <a:off x="6374709" y="5852712"/>
-              <a:ext cx="5864184" cy="369332"/>
-            </a:xfrm>
-            <a:prstGeom prst="rect">
-              <a:avLst/>
-            </a:prstGeom>
-            <a:solidFill>
-              <a:srgbClr val="FF0000"/>
-            </a:solidFill>
-            <a:effectLst>
-              <a:softEdge rad="31750"/>
-            </a:effectLst>
-          </p:spPr>
-          <p:txBody>
-            <a:bodyPr wrap="square">
-              <a:spAutoFit/>
-            </a:bodyPr>
-            <a:lstStyle/>
-            <a:p>
-              <a:r>
-                <a:rPr lang="zh-CN" altLang="en-US" dirty="0">
-                  <a:solidFill>
-                    <a:schemeClr val="bg1"/>
-                  </a:solidFill>
-                  <a:latin typeface="Times New Roman" panose="02020603050405020304" pitchFamily="18" charset="0"/>
-                  <a:ea typeface="KaiTi_GB2312" panose="02010609030101010101" pitchFamily="49" charset="-122"/>
-                  <a:cs typeface="Times New Roman" panose="02020603050405020304" pitchFamily="18" charset="0"/>
-                </a:rPr>
-                <a:t>红色结点为叶子结点，表示此时结算，也表示递归终止。</a:t>
-              </a:r>
-              <a:endParaRPr lang="en-US" altLang="zh-CN" dirty="0">
-                <a:solidFill>
-                  <a:schemeClr val="bg1"/>
-                </a:solidFill>
-                <a:latin typeface="Times New Roman" panose="02020603050405020304" pitchFamily="18" charset="0"/>
-                <a:ea typeface="KaiTi_GB2312" panose="02010609030101010101" pitchFamily="49" charset="-122"/>
-                <a:cs typeface="Times New Roman" panose="02020603050405020304" pitchFamily="18" charset="0"/>
-              </a:endParaRPr>
-            </a:p>
-          </p:txBody>
-        </p:sp>
-        <p:sp>
-          <p:nvSpPr>
-            <p:cNvPr id="6" name="矩形 5">
-              <a:extLst>
-                <a:ext uri="{FF2B5EF4-FFF2-40B4-BE49-F238E27FC236}">
-                  <a16:creationId xmlns:a16="http://schemas.microsoft.com/office/drawing/2014/main" id="{18AA1A88-9EC1-CD4F-85F6-27135D3C43C7}"/>
-                </a:ext>
-              </a:extLst>
-            </p:cNvPr>
-            <p:cNvSpPr/>
-            <p:nvPr/>
-          </p:nvSpPr>
-          <p:spPr>
-            <a:xfrm>
-              <a:off x="6374710" y="6298119"/>
-              <a:ext cx="4281568" cy="369332"/>
-            </a:xfrm>
-            <a:prstGeom prst="rect">
-              <a:avLst/>
-            </a:prstGeom>
-            <a:solidFill>
-              <a:srgbClr val="FF40FF"/>
-            </a:solidFill>
-            <a:effectLst>
-              <a:softEdge rad="31750"/>
-            </a:effectLst>
-          </p:spPr>
-          <p:txBody>
-            <a:bodyPr wrap="square">
-              <a:spAutoFit/>
-            </a:bodyPr>
-            <a:lstStyle/>
-            <a:p>
-              <a:r>
-                <a:rPr lang="zh-CN" altLang="en-US" dirty="0">
-                  <a:solidFill>
-                    <a:schemeClr val="bg1"/>
-                  </a:solidFill>
-                  <a:latin typeface="Times New Roman" panose="02020603050405020304" pitchFamily="18" charset="0"/>
-                  <a:ea typeface="KaiTi_GB2312" panose="02010609030101010101" pitchFamily="49" charset="-122"/>
-                  <a:cs typeface="Times New Roman" panose="02020603050405020304" pitchFamily="18" charset="0"/>
-                </a:rPr>
-                <a:t>粉色结点也为叶子结点，表示递归终止。</a:t>
-              </a:r>
-              <a:endParaRPr lang="en-US" altLang="zh-CN" dirty="0">
-                <a:solidFill>
-                  <a:schemeClr val="bg1"/>
-                </a:solidFill>
-                <a:latin typeface="Times New Roman" panose="02020603050405020304" pitchFamily="18" charset="0"/>
-                <a:ea typeface="KaiTi_GB2312" panose="02010609030101010101" pitchFamily="49" charset="-122"/>
-                <a:cs typeface="Times New Roman" panose="02020603050405020304" pitchFamily="18" charset="0"/>
-              </a:endParaRPr>
-            </a:p>
-          </p:txBody>
-        </p:sp>
-        <p:sp>
-          <p:nvSpPr>
-            <p:cNvPr id="7" name="矩形 6">
-              <a:extLst>
-                <a:ext uri="{FF2B5EF4-FFF2-40B4-BE49-F238E27FC236}">
-                  <a16:creationId xmlns:a16="http://schemas.microsoft.com/office/drawing/2014/main" id="{91E17777-81F4-DD45-9E1F-86803556905A}"/>
-                </a:ext>
-              </a:extLst>
-            </p:cNvPr>
-            <p:cNvSpPr/>
-            <p:nvPr/>
-          </p:nvSpPr>
-          <p:spPr>
-            <a:xfrm>
-              <a:off x="6374709" y="5013009"/>
-              <a:ext cx="790598" cy="369332"/>
-            </a:xfrm>
-            <a:prstGeom prst="rect">
-              <a:avLst/>
-            </a:prstGeom>
-          </p:spPr>
-          <p:txBody>
-            <a:bodyPr wrap="square">
-              <a:spAutoFit/>
-            </a:bodyPr>
-            <a:lstStyle/>
-            <a:p>
-              <a:r>
-                <a:rPr lang="zh-CN" altLang="en-US" dirty="0">
-                  <a:latin typeface="Times New Roman" charset="0"/>
-                  <a:ea typeface="楷体" charset="-122"/>
-                  <a:cs typeface="Times New Roman" charset="0"/>
-                </a:rPr>
-                <a:t>图例：</a:t>
-              </a:r>
-            </a:p>
-          </p:txBody>
-        </p:sp>
-      </p:grpSp>
-    </p:spTree>
-    <p:extLst>
-      <p:ext uri="{BB962C8B-B14F-4D97-AF65-F5344CB8AC3E}">
-        <p14:creationId xmlns:p14="http://schemas.microsoft.com/office/powerpoint/2010/main" val="756369477"/>
+        <p14:creationId xmlns:p14="http://schemas.microsoft.com/office/powerpoint/2010/main" xmlns="" val="3320046645"/>
       </p:ext>
     </p:extLst>
   </p:cSld>
@@ -2205,7 +1844,7 @@
     </a:clrScheme>
     <a:fontScheme name="Office 主题​​">
       <a:majorFont>
-        <a:latin typeface="Calibri Light" panose="020F0302020204030204"/>
+        <a:latin typeface="Calibri Light"/>
         <a:ea typeface=""/>
         <a:cs typeface=""/>
         <a:font script="Jpan" typeface="游ゴシック Light"/>
@@ -2240,7 +1879,7 @@
         <a:font script="Geor" typeface="Sylfaen"/>
       </a:majorFont>
       <a:minorFont>
-        <a:latin typeface="Calibri" panose="020F0502020204030204"/>
+        <a:latin typeface="Calibri"/>
         <a:ea typeface=""/>
         <a:cs typeface=""/>
         <a:font script="Jpan" typeface="游ゴシック"/>
@@ -2417,7 +2056,7 @@
   <a:extraClrSchemeLst/>
   <a:extLst>
     <a:ext uri="{05A4C25C-085E-4340-85A3-A5531E510DB2}">
-      <thm15:themeFamily xmlns:thm15="http://schemas.microsoft.com/office/thememl/2012/main" name="Office Theme" id="{62F939B6-93AF-4DB8-9C6B-D6C7DFDC589F}" vid="{AE6F2518-B084-4896-AF52-66CC2144AA26}"/>
+      <thm15:themeFamily xmlns:thm15="http://schemas.microsoft.com/office/thememl/2012/main" xmlns="" name="Office Theme" id="{62F939B6-93AF-4DB8-9C6B-D6C7DFDC589F}" vid="{AE6F2518-B084-4896-AF52-66CC2144AA26}"/>
     </a:ext>
   </a:extLst>
 </a:theme>

</xml_diff>